<commit_message>
Added procrastinate log error files. Also applied more stringent implementation prioritizing deadline events.
***Bugs****
Procrastinate error for repeating events
</commit_message>
<xml_diff>
--- a/Requirements_And_Design/SelectedEventImage.pptx
+++ b/Requirements_And_Design/SelectedEventImage.pptx
@@ -952,7 +952,7 @@
           <a:p>
             <a:fld id="{31276AD4-C39E-4EBA-981E-AA690C3DD537}" type="datetimeFigureOut">
               <a:rPr lang="en-US" smtClean="0"/>
-              <a:t>3/25/2014</a:t>
+              <a:t>3/27/2014</a:t>
             </a:fld>
             <a:endParaRPr lang="en-US"/>
           </a:p>
@@ -1401,7 +1401,7 @@
           <a:p>
             <a:fld id="{E946C74D-DD12-43CA-AB61-CEB9B4EE38E1}" type="datetimeFigureOut">
               <a:rPr lang="en-US" smtClean="0"/>
-              <a:t>3/25/2014</a:t>
+              <a:t>3/27/2014</a:t>
             </a:fld>
             <a:endParaRPr lang="en-US"/>
           </a:p>
@@ -1571,7 +1571,7 @@
           <a:p>
             <a:fld id="{E946C74D-DD12-43CA-AB61-CEB9B4EE38E1}" type="datetimeFigureOut">
               <a:rPr lang="en-US" smtClean="0"/>
-              <a:t>3/25/2014</a:t>
+              <a:t>3/27/2014</a:t>
             </a:fld>
             <a:endParaRPr lang="en-US"/>
           </a:p>
@@ -1751,7 +1751,7 @@
           <a:p>
             <a:fld id="{E946C74D-DD12-43CA-AB61-CEB9B4EE38E1}" type="datetimeFigureOut">
               <a:rPr lang="en-US" smtClean="0"/>
-              <a:t>3/25/2014</a:t>
+              <a:t>3/27/2014</a:t>
             </a:fld>
             <a:endParaRPr lang="en-US"/>
           </a:p>
@@ -1921,7 +1921,7 @@
           <a:p>
             <a:fld id="{E946C74D-DD12-43CA-AB61-CEB9B4EE38E1}" type="datetimeFigureOut">
               <a:rPr lang="en-US" smtClean="0"/>
-              <a:t>3/25/2014</a:t>
+              <a:t>3/27/2014</a:t>
             </a:fld>
             <a:endParaRPr lang="en-US"/>
           </a:p>
@@ -2167,7 +2167,7 @@
           <a:p>
             <a:fld id="{E946C74D-DD12-43CA-AB61-CEB9B4EE38E1}" type="datetimeFigureOut">
               <a:rPr lang="en-US" smtClean="0"/>
-              <a:t>3/25/2014</a:t>
+              <a:t>3/27/2014</a:t>
             </a:fld>
             <a:endParaRPr lang="en-US"/>
           </a:p>
@@ -2455,7 +2455,7 @@
           <a:p>
             <a:fld id="{E946C74D-DD12-43CA-AB61-CEB9B4EE38E1}" type="datetimeFigureOut">
               <a:rPr lang="en-US" smtClean="0"/>
-              <a:t>3/25/2014</a:t>
+              <a:t>3/27/2014</a:t>
             </a:fld>
             <a:endParaRPr lang="en-US"/>
           </a:p>
@@ -2877,7 +2877,7 @@
           <a:p>
             <a:fld id="{E946C74D-DD12-43CA-AB61-CEB9B4EE38E1}" type="datetimeFigureOut">
               <a:rPr lang="en-US" smtClean="0"/>
-              <a:t>3/25/2014</a:t>
+              <a:t>3/27/2014</a:t>
             </a:fld>
             <a:endParaRPr lang="en-US"/>
           </a:p>
@@ -2995,7 +2995,7 @@
           <a:p>
             <a:fld id="{E946C74D-DD12-43CA-AB61-CEB9B4EE38E1}" type="datetimeFigureOut">
               <a:rPr lang="en-US" smtClean="0"/>
-              <a:t>3/25/2014</a:t>
+              <a:t>3/27/2014</a:t>
             </a:fld>
             <a:endParaRPr lang="en-US"/>
           </a:p>
@@ -3090,7 +3090,7 @@
           <a:p>
             <a:fld id="{E946C74D-DD12-43CA-AB61-CEB9B4EE38E1}" type="datetimeFigureOut">
               <a:rPr lang="en-US" smtClean="0"/>
-              <a:t>3/25/2014</a:t>
+              <a:t>3/27/2014</a:t>
             </a:fld>
             <a:endParaRPr lang="en-US"/>
           </a:p>
@@ -3367,7 +3367,7 @@
           <a:p>
             <a:fld id="{E946C74D-DD12-43CA-AB61-CEB9B4EE38E1}" type="datetimeFigureOut">
               <a:rPr lang="en-US" smtClean="0"/>
-              <a:t>3/25/2014</a:t>
+              <a:t>3/27/2014</a:t>
             </a:fld>
             <a:endParaRPr lang="en-US"/>
           </a:p>
@@ -3620,7 +3620,7 @@
           <a:p>
             <a:fld id="{E946C74D-DD12-43CA-AB61-CEB9B4EE38E1}" type="datetimeFigureOut">
               <a:rPr lang="en-US" smtClean="0"/>
-              <a:t>3/25/2014</a:t>
+              <a:t>3/27/2014</a:t>
             </a:fld>
             <a:endParaRPr lang="en-US"/>
           </a:p>
@@ -3833,7 +3833,7 @@
           <a:p>
             <a:fld id="{E946C74D-DD12-43CA-AB61-CEB9B4EE38E1}" type="datetimeFigureOut">
               <a:rPr lang="en-US" smtClean="0"/>
-              <a:t>3/25/2014</a:t>
+              <a:t>3/27/2014</a:t>
             </a:fld>
             <a:endParaRPr lang="en-US"/>
           </a:p>
@@ -27225,13 +27225,13 @@
           <p:nvPr>
             <p:extLst>
               <p:ext uri="{D42A27DB-BD31-4B8C-83A1-F6EECF244321}">
-                <p14:modId xmlns:p14="http://schemas.microsoft.com/office/powerpoint/2010/main" val="4026448434"/>
+                <p14:modId xmlns:p14="http://schemas.microsoft.com/office/powerpoint/2010/main" val="401254164"/>
               </p:ext>
             </p:extLst>
           </p:nvPr>
         </p:nvGraphicFramePr>
         <p:xfrm>
-          <a:off x="1744834" y="3733800"/>
+          <a:off x="1725856" y="3733800"/>
           <a:ext cx="4625487" cy="2057400"/>
         </p:xfrm>
         <a:graphic>
@@ -27482,6 +27482,142 @@
           </p:txBody>
         </p:sp>
       </p:grpSp>
+      <p:sp>
+        <p:nvSpPr>
+          <p:cNvPr id="55" name="Rectangle 54"/>
+          <p:cNvSpPr/>
+          <p:nvPr/>
+        </p:nvSpPr>
+        <p:spPr>
+          <a:xfrm>
+            <a:off x="1189911" y="2971800"/>
+            <a:ext cx="430022" cy="223914"/>
+          </a:xfrm>
+          <a:prstGeom prst="rect">
+            <a:avLst/>
+          </a:prstGeom>
+          <a:solidFill>
+            <a:srgbClr val="323232"/>
+          </a:solidFill>
+          <a:ln>
+            <a:noFill/>
+          </a:ln>
+        </p:spPr>
+        <p:style>
+          <a:lnRef idx="2">
+            <a:schemeClr val="accent1">
+              <a:shade val="50000"/>
+            </a:schemeClr>
+          </a:lnRef>
+          <a:fillRef idx="1">
+            <a:schemeClr val="accent1"/>
+          </a:fillRef>
+          <a:effectRef idx="0">
+            <a:schemeClr val="accent1"/>
+          </a:effectRef>
+          <a:fontRef idx="minor">
+            <a:schemeClr val="lt1"/>
+          </a:fontRef>
+        </p:style>
+        <p:txBody>
+          <a:bodyPr rtlCol="0" anchor="ctr"/>
+          <a:lstStyle/>
+          <a:p>
+            <a:pPr algn="ctr"/>
+            <a:r>
+              <a:rPr lang="en-US" b="1" dirty="0" smtClean="0">
+                <a:solidFill>
+                  <a:schemeClr val="bg1">
+                    <a:lumMod val="85000"/>
+                  </a:schemeClr>
+                </a:solidFill>
+                <a:latin typeface="Arabic Typesetting" panose="03020402040406030203" pitchFamily="66" charset="-78"/>
+                <a:cs typeface="Arabic Typesetting" panose="03020402040406030203" pitchFamily="66" charset="-78"/>
+              </a:rPr>
+              <a:t>8</a:t>
+            </a:r>
+            <a:endParaRPr lang="en-US" b="1" dirty="0">
+              <a:solidFill>
+                <a:schemeClr val="bg1">
+                  <a:lumMod val="85000"/>
+                </a:schemeClr>
+              </a:solidFill>
+              <a:latin typeface="Arabic Typesetting" panose="03020402040406030203" pitchFamily="66" charset="-78"/>
+              <a:cs typeface="Arabic Typesetting" panose="03020402040406030203" pitchFamily="66" charset="-78"/>
+            </a:endParaRPr>
+          </a:p>
+        </p:txBody>
+      </p:sp>
+      <p:sp>
+        <p:nvSpPr>
+          <p:cNvPr id="56" name="Rectangle 55"/>
+          <p:cNvSpPr/>
+          <p:nvPr/>
+        </p:nvSpPr>
+        <p:spPr>
+          <a:xfrm>
+            <a:off x="1238963" y="3460897"/>
+            <a:ext cx="430022" cy="223914"/>
+          </a:xfrm>
+          <a:prstGeom prst="rect">
+            <a:avLst/>
+          </a:prstGeom>
+          <a:solidFill>
+            <a:schemeClr val="bg1">
+              <a:lumMod val="85000"/>
+            </a:schemeClr>
+          </a:solidFill>
+          <a:ln>
+            <a:noFill/>
+          </a:ln>
+        </p:spPr>
+        <p:style>
+          <a:lnRef idx="2">
+            <a:schemeClr val="accent1">
+              <a:shade val="50000"/>
+            </a:schemeClr>
+          </a:lnRef>
+          <a:fillRef idx="1">
+            <a:schemeClr val="accent1"/>
+          </a:fillRef>
+          <a:effectRef idx="0">
+            <a:schemeClr val="accent1"/>
+          </a:effectRef>
+          <a:fontRef idx="minor">
+            <a:schemeClr val="lt1"/>
+          </a:fontRef>
+        </p:style>
+        <p:txBody>
+          <a:bodyPr rtlCol="0" anchor="ctr"/>
+          <a:lstStyle/>
+          <a:p>
+            <a:pPr algn="ctr"/>
+            <a:r>
+              <a:rPr lang="en-US" b="1" dirty="0" smtClean="0">
+                <a:solidFill>
+                  <a:schemeClr val="tx1">
+                    <a:lumMod val="75000"/>
+                    <a:lumOff val="25000"/>
+                  </a:schemeClr>
+                </a:solidFill>
+                <a:latin typeface="Arabic Typesetting" panose="03020402040406030203" pitchFamily="66" charset="-78"/>
+                <a:cs typeface="Arabic Typesetting" panose="03020402040406030203" pitchFamily="66" charset="-78"/>
+              </a:rPr>
+              <a:t>8</a:t>
+            </a:r>
+            <a:endParaRPr lang="en-US" b="1" dirty="0">
+              <a:solidFill>
+                <a:schemeClr val="tx1">
+                  <a:lumMod val="75000"/>
+                  <a:lumOff val="25000"/>
+                </a:schemeClr>
+              </a:solidFill>
+              <a:latin typeface="Arabic Typesetting" panose="03020402040406030203" pitchFamily="66" charset="-78"/>
+              <a:cs typeface="Arabic Typesetting" panose="03020402040406030203" pitchFamily="66" charset="-78"/>
+            </a:endParaRPr>
+          </a:p>
+        </p:txBody>
+      </p:sp>
     </p:spTree>
     <p:extLst>
       <p:ext uri="{BB962C8B-B14F-4D97-AF65-F5344CB8AC3E}">

</xml_diff>